<commit_message>
addressed technical review items
</commit_message>
<xml_diff>
--- a/figs/farmer-exchange-fig.pptx
+++ b/figs/farmer-exchange-fig.pptx
@@ -246,7 +246,7 @@
           <a:p>
             <a:fld id="{0732DD73-D1D4-4E9F-8E19-15BB36F317BB}" type="datetimeFigureOut">
               <a:rPr lang="da-DK" smtClean="0"/>
-              <a:t>09-06-2024</a:t>
+              <a:t>20-06-2024</a:t>
             </a:fld>
             <a:endParaRPr lang="da-DK"/>
           </a:p>
@@ -416,7 +416,7 @@
           <a:p>
             <a:fld id="{0732DD73-D1D4-4E9F-8E19-15BB36F317BB}" type="datetimeFigureOut">
               <a:rPr lang="da-DK" smtClean="0"/>
-              <a:t>09-06-2024</a:t>
+              <a:t>20-06-2024</a:t>
             </a:fld>
             <a:endParaRPr lang="da-DK"/>
           </a:p>
@@ -596,7 +596,7 @@
           <a:p>
             <a:fld id="{0732DD73-D1D4-4E9F-8E19-15BB36F317BB}" type="datetimeFigureOut">
               <a:rPr lang="da-DK" smtClean="0"/>
-              <a:t>09-06-2024</a:t>
+              <a:t>20-06-2024</a:t>
             </a:fld>
             <a:endParaRPr lang="da-DK"/>
           </a:p>
@@ -766,7 +766,7 @@
           <a:p>
             <a:fld id="{0732DD73-D1D4-4E9F-8E19-15BB36F317BB}" type="datetimeFigureOut">
               <a:rPr lang="da-DK" smtClean="0"/>
-              <a:t>09-06-2024</a:t>
+              <a:t>20-06-2024</a:t>
             </a:fld>
             <a:endParaRPr lang="da-DK"/>
           </a:p>
@@ -1012,7 +1012,7 @@
           <a:p>
             <a:fld id="{0732DD73-D1D4-4E9F-8E19-15BB36F317BB}" type="datetimeFigureOut">
               <a:rPr lang="da-DK" smtClean="0"/>
-              <a:t>09-06-2024</a:t>
+              <a:t>20-06-2024</a:t>
             </a:fld>
             <a:endParaRPr lang="da-DK"/>
           </a:p>
@@ -1244,7 +1244,7 @@
           <a:p>
             <a:fld id="{0732DD73-D1D4-4E9F-8E19-15BB36F317BB}" type="datetimeFigureOut">
               <a:rPr lang="da-DK" smtClean="0"/>
-              <a:t>09-06-2024</a:t>
+              <a:t>20-06-2024</a:t>
             </a:fld>
             <a:endParaRPr lang="da-DK"/>
           </a:p>
@@ -1611,7 +1611,7 @@
           <a:p>
             <a:fld id="{0732DD73-D1D4-4E9F-8E19-15BB36F317BB}" type="datetimeFigureOut">
               <a:rPr lang="da-DK" smtClean="0"/>
-              <a:t>09-06-2024</a:t>
+              <a:t>20-06-2024</a:t>
             </a:fld>
             <a:endParaRPr lang="da-DK"/>
           </a:p>
@@ -1729,7 +1729,7 @@
           <a:p>
             <a:fld id="{0732DD73-D1D4-4E9F-8E19-15BB36F317BB}" type="datetimeFigureOut">
               <a:rPr lang="da-DK" smtClean="0"/>
-              <a:t>09-06-2024</a:t>
+              <a:t>20-06-2024</a:t>
             </a:fld>
             <a:endParaRPr lang="da-DK"/>
           </a:p>
@@ -1824,7 +1824,7 @@
           <a:p>
             <a:fld id="{0732DD73-D1D4-4E9F-8E19-15BB36F317BB}" type="datetimeFigureOut">
               <a:rPr lang="da-DK" smtClean="0"/>
-              <a:t>09-06-2024</a:t>
+              <a:t>20-06-2024</a:t>
             </a:fld>
             <a:endParaRPr lang="da-DK"/>
           </a:p>
@@ -2101,7 +2101,7 @@
           <a:p>
             <a:fld id="{0732DD73-D1D4-4E9F-8E19-15BB36F317BB}" type="datetimeFigureOut">
               <a:rPr lang="da-DK" smtClean="0"/>
-              <a:t>09-06-2024</a:t>
+              <a:t>20-06-2024</a:t>
             </a:fld>
             <a:endParaRPr lang="da-DK"/>
           </a:p>
@@ -2358,7 +2358,7 @@
           <a:p>
             <a:fld id="{0732DD73-D1D4-4E9F-8E19-15BB36F317BB}" type="datetimeFigureOut">
               <a:rPr lang="da-DK" smtClean="0"/>
-              <a:t>09-06-2024</a:t>
+              <a:t>20-06-2024</a:t>
             </a:fld>
             <a:endParaRPr lang="da-DK"/>
           </a:p>
@@ -2571,7 +2571,7 @@
           <a:p>
             <a:fld id="{0732DD73-D1D4-4E9F-8E19-15BB36F317BB}" type="datetimeFigureOut">
               <a:rPr lang="da-DK" smtClean="0"/>
-              <a:t>09-06-2024</a:t>
+              <a:t>20-06-2024</a:t>
             </a:fld>
             <a:endParaRPr lang="da-DK"/>
           </a:p>
@@ -5718,8 +5718,8 @@
           </p:nvSpPr>
           <p:spPr>
             <a:xfrm>
-              <a:off x="2386829" y="4346212"/>
-              <a:ext cx="1730954" cy="287128"/>
+              <a:off x="2253568" y="4346212"/>
+              <a:ext cx="2094454" cy="287128"/>
             </a:xfrm>
             <a:prstGeom prst="leftArrow">
               <a:avLst/>
@@ -5762,7 +5762,7 @@
                   <a:ea typeface="ADLaM Display" panose="02010000000000000000" pitchFamily="2" charset="0"/>
                   <a:cs typeface="ADLaM Display" panose="02010000000000000000" pitchFamily="2" charset="0"/>
                 </a:rPr>
-                <a:t>Time, resources, money</a:t>
+                <a:t>Time, resources, compensation</a:t>
               </a:r>
               <a:endParaRPr lang="da-DK" sz="900" dirty="0">
                 <a:solidFill>

</xml_diff>